<commit_message>
Add second list of staff
</commit_message>
<xml_diff>
--- a/motd/Pages.pptx
+++ b/motd/Pages.pptx
@@ -9,6 +9,7 @@
     <p:sldId id="257" r:id="rId3"/>
     <p:sldId id="258" r:id="rId4"/>
     <p:sldId id="259" r:id="rId5"/>
+    <p:sldId id="260" r:id="rId6"/>
   </p:sldIdLst>
   <p:sldSz cx="15552738" cy="5184775"/>
   <p:notesSz cx="6858000" cy="9144000"/>
@@ -275,7 +276,7 @@
           <a:p>
             <a:fld id="{C370886D-31C3-49D5-85A0-7ED07EBF33A1}" type="datetimeFigureOut">
               <a:rPr lang="en-GB" smtClean="0"/>
-              <a:t>10/11/2018</a:t>
+              <a:t>21/11/2018</a:t>
             </a:fld>
             <a:endParaRPr lang="en-GB"/>
           </a:p>
@@ -475,7 +476,7 @@
           <a:p>
             <a:fld id="{C370886D-31C3-49D5-85A0-7ED07EBF33A1}" type="datetimeFigureOut">
               <a:rPr lang="en-GB" smtClean="0"/>
-              <a:t>10/11/2018</a:t>
+              <a:t>21/11/2018</a:t>
             </a:fld>
             <a:endParaRPr lang="en-GB"/>
           </a:p>
@@ -685,7 +686,7 @@
           <a:p>
             <a:fld id="{C370886D-31C3-49D5-85A0-7ED07EBF33A1}" type="datetimeFigureOut">
               <a:rPr lang="en-GB" smtClean="0"/>
-              <a:t>10/11/2018</a:t>
+              <a:t>21/11/2018</a:t>
             </a:fld>
             <a:endParaRPr lang="en-GB"/>
           </a:p>
@@ -885,7 +886,7 @@
           <a:p>
             <a:fld id="{C370886D-31C3-49D5-85A0-7ED07EBF33A1}" type="datetimeFigureOut">
               <a:rPr lang="en-GB" smtClean="0"/>
-              <a:t>10/11/2018</a:t>
+              <a:t>21/11/2018</a:t>
             </a:fld>
             <a:endParaRPr lang="en-GB"/>
           </a:p>
@@ -1161,7 +1162,7 @@
           <a:p>
             <a:fld id="{C370886D-31C3-49D5-85A0-7ED07EBF33A1}" type="datetimeFigureOut">
               <a:rPr lang="en-GB" smtClean="0"/>
-              <a:t>10/11/2018</a:t>
+              <a:t>21/11/2018</a:t>
             </a:fld>
             <a:endParaRPr lang="en-GB"/>
           </a:p>
@@ -1429,7 +1430,7 @@
           <a:p>
             <a:fld id="{C370886D-31C3-49D5-85A0-7ED07EBF33A1}" type="datetimeFigureOut">
               <a:rPr lang="en-GB" smtClean="0"/>
-              <a:t>10/11/2018</a:t>
+              <a:t>21/11/2018</a:t>
             </a:fld>
             <a:endParaRPr lang="en-GB"/>
           </a:p>
@@ -1844,7 +1845,7 @@
           <a:p>
             <a:fld id="{C370886D-31C3-49D5-85A0-7ED07EBF33A1}" type="datetimeFigureOut">
               <a:rPr lang="en-GB" smtClean="0"/>
-              <a:t>10/11/2018</a:t>
+              <a:t>21/11/2018</a:t>
             </a:fld>
             <a:endParaRPr lang="en-GB"/>
           </a:p>
@@ -1986,7 +1987,7 @@
           <a:p>
             <a:fld id="{C370886D-31C3-49D5-85A0-7ED07EBF33A1}" type="datetimeFigureOut">
               <a:rPr lang="en-GB" smtClean="0"/>
-              <a:t>10/11/2018</a:t>
+              <a:t>21/11/2018</a:t>
             </a:fld>
             <a:endParaRPr lang="en-GB"/>
           </a:p>
@@ -2099,7 +2100,7 @@
           <a:p>
             <a:fld id="{C370886D-31C3-49D5-85A0-7ED07EBF33A1}" type="datetimeFigureOut">
               <a:rPr lang="en-GB" smtClean="0"/>
-              <a:t>10/11/2018</a:t>
+              <a:t>21/11/2018</a:t>
             </a:fld>
             <a:endParaRPr lang="en-GB"/>
           </a:p>
@@ -2412,7 +2413,7 @@
           <a:p>
             <a:fld id="{C370886D-31C3-49D5-85A0-7ED07EBF33A1}" type="datetimeFigureOut">
               <a:rPr lang="en-GB" smtClean="0"/>
-              <a:t>10/11/2018</a:t>
+              <a:t>21/11/2018</a:t>
             </a:fld>
             <a:endParaRPr lang="en-GB"/>
           </a:p>
@@ -2705,7 +2706,7 @@
           <a:p>
             <a:fld id="{C370886D-31C3-49D5-85A0-7ED07EBF33A1}" type="datetimeFigureOut">
               <a:rPr lang="en-GB" smtClean="0"/>
-              <a:t>10/11/2018</a:t>
+              <a:t>21/11/2018</a:t>
             </a:fld>
             <a:endParaRPr lang="en-GB"/>
           </a:p>
@@ -2948,7 +2949,7 @@
           <a:p>
             <a:fld id="{C370886D-31C3-49D5-85A0-7ED07EBF33A1}" type="datetimeFigureOut">
               <a:rPr lang="en-GB" smtClean="0"/>
-              <a:t>10/11/2018</a:t>
+              <a:t>21/11/2018</a:t>
             </a:fld>
             <a:endParaRPr lang="en-GB"/>
           </a:p>
@@ -5733,7 +5734,7 @@
                       <a:schemeClr val="bg1"/>
                     </a:solidFill>
                   </a:rPr>
-                  <a:t>Here’s a list of our staff members:</a:t>
+                  <a:t>Here’s our staff members (1/2):</a:t>
                 </a:r>
               </a:p>
             </p:txBody>
@@ -5805,6 +5806,480 @@
     <p:extLst>
       <p:ext uri="{BB962C8B-B14F-4D97-AF65-F5344CB8AC3E}">
         <p14:creationId xmlns:p14="http://schemas.microsoft.com/office/powerpoint/2010/main" val="3598990895"/>
+      </p:ext>
+    </p:extLst>
+  </p:cSld>
+  <p:clrMapOvr>
+    <a:masterClrMapping/>
+  </p:clrMapOvr>
+</p:sld>
+</file>
+
+<file path=ppt/slides/slide5.xml><?xml version="1.0" encoding="utf-8"?>
+<p:sld xmlns:a="http://schemas.openxmlformats.org/drawingml/2006/main" xmlns:r="http://schemas.openxmlformats.org/officeDocument/2006/relationships" xmlns:p="http://schemas.openxmlformats.org/presentationml/2006/main">
+  <p:cSld>
+    <p:bg>
+      <p:bgPr>
+        <a:gradFill>
+          <a:gsLst>
+            <a:gs pos="0">
+              <a:schemeClr val="accent2"/>
+            </a:gs>
+            <a:gs pos="100000">
+              <a:schemeClr val="accent2">
+                <a:lumMod val="40000"/>
+                <a:lumOff val="60000"/>
+              </a:schemeClr>
+            </a:gs>
+          </a:gsLst>
+          <a:lin ang="2700000" scaled="0"/>
+        </a:gradFill>
+        <a:effectLst/>
+      </p:bgPr>
+    </p:bg>
+    <p:spTree>
+      <p:nvGrpSpPr>
+        <p:cNvPr id="1" name=""/>
+        <p:cNvGrpSpPr/>
+        <p:nvPr/>
+      </p:nvGrpSpPr>
+      <p:grpSpPr>
+        <a:xfrm>
+          <a:off x="0" y="0"/>
+          <a:ext cx="0" cy="0"/>
+          <a:chOff x="0" y="0"/>
+          <a:chExt cx="0" cy="0"/>
+        </a:xfrm>
+      </p:grpSpPr>
+      <p:grpSp>
+        <p:nvGrpSpPr>
+          <p:cNvPr id="9" name="Group 8">
+            <a:extLst>
+              <a:ext uri="{FF2B5EF4-FFF2-40B4-BE49-F238E27FC236}">
+                <a16:creationId xmlns:a16="http://schemas.microsoft.com/office/drawing/2014/main" id="{80F282EF-D6F2-4F06-8646-FD14516E8488}"/>
+              </a:ext>
+            </a:extLst>
+          </p:cNvPr>
+          <p:cNvGrpSpPr/>
+          <p:nvPr/>
+        </p:nvGrpSpPr>
+        <p:grpSpPr>
+          <a:xfrm>
+            <a:off x="409451" y="310435"/>
+            <a:ext cx="14589654" cy="4163795"/>
+            <a:chOff x="409451" y="310435"/>
+            <a:chExt cx="14589654" cy="4163795"/>
+          </a:xfrm>
+        </p:grpSpPr>
+        <p:sp>
+          <p:nvSpPr>
+            <p:cNvPr id="7" name="TextBox 6">
+              <a:extLst>
+                <a:ext uri="{FF2B5EF4-FFF2-40B4-BE49-F238E27FC236}">
+                  <a16:creationId xmlns:a16="http://schemas.microsoft.com/office/drawing/2014/main" id="{2AD4DB4F-2FEB-46FF-AA66-89B163A9E2B7}"/>
+                </a:ext>
+              </a:extLst>
+            </p:cNvPr>
+            <p:cNvSpPr txBox="1"/>
+            <p:nvPr/>
+          </p:nvSpPr>
+          <p:spPr>
+            <a:xfrm>
+              <a:off x="2105294" y="310435"/>
+              <a:ext cx="5731057" cy="830997"/>
+            </a:xfrm>
+            <a:prstGeom prst="rect">
+              <a:avLst/>
+            </a:prstGeom>
+            <a:noFill/>
+          </p:spPr>
+          <p:txBody>
+            <a:bodyPr wrap="none" rtlCol="0">
+              <a:spAutoFit/>
+            </a:bodyPr>
+            <a:lstStyle/>
+            <a:p>
+              <a:pPr algn="ctr"/>
+              <a:r>
+                <a:rPr lang="en-GB" sz="4800" b="1" dirty="0">
+                  <a:solidFill>
+                    <a:schemeClr val="bg1"/>
+                  </a:solidFill>
+                  <a:latin typeface="+mj-lt"/>
+                </a:rPr>
+                <a:t>KNOW YOUR STAFF</a:t>
+              </a:r>
+            </a:p>
+          </p:txBody>
+        </p:sp>
+        <p:sp>
+          <p:nvSpPr>
+            <p:cNvPr id="8" name="TextBox 7">
+              <a:extLst>
+                <a:ext uri="{FF2B5EF4-FFF2-40B4-BE49-F238E27FC236}">
+                  <a16:creationId xmlns:a16="http://schemas.microsoft.com/office/drawing/2014/main" id="{7C6E5EB9-D4B6-4FA7-811F-347391768A37}"/>
+                </a:ext>
+              </a:extLst>
+            </p:cNvPr>
+            <p:cNvSpPr txBox="1"/>
+            <p:nvPr/>
+          </p:nvSpPr>
+          <p:spPr>
+            <a:xfrm>
+              <a:off x="409451" y="1141432"/>
+              <a:ext cx="9122732" cy="1384995"/>
+            </a:xfrm>
+            <a:prstGeom prst="rect">
+              <a:avLst/>
+            </a:prstGeom>
+            <a:noFill/>
+          </p:spPr>
+          <p:txBody>
+            <a:bodyPr wrap="square" rtlCol="0">
+              <a:spAutoFit/>
+            </a:bodyPr>
+            <a:lstStyle/>
+            <a:p>
+              <a:pPr algn="ctr"/>
+              <a:r>
+                <a:rPr lang="en-GB" sz="2800" dirty="0" err="1">
+                  <a:solidFill>
+                    <a:schemeClr val="bg1"/>
+                  </a:solidFill>
+                </a:rPr>
+                <a:t>GameProxy</a:t>
+              </a:r>
+              <a:r>
+                <a:rPr lang="en-GB" sz="2800" dirty="0">
+                  <a:solidFill>
+                    <a:schemeClr val="bg1"/>
+                  </a:solidFill>
+                </a:rPr>
+                <a:t> uses coloured names for staff users. With games, if the creator has a coloured name, it means it was officially uploaded by a staff member of </a:t>
+              </a:r>
+              <a:r>
+                <a:rPr lang="en-GB" sz="2800" dirty="0" err="1">
+                  <a:solidFill>
+                    <a:schemeClr val="bg1"/>
+                  </a:solidFill>
+                </a:rPr>
+                <a:t>GameProxy</a:t>
+              </a:r>
+              <a:r>
+                <a:rPr lang="en-GB" sz="2800" dirty="0">
+                  <a:solidFill>
+                    <a:schemeClr val="bg1"/>
+                  </a:solidFill>
+                </a:rPr>
+                <a:t>.</a:t>
+              </a:r>
+            </a:p>
+          </p:txBody>
+        </p:sp>
+        <p:sp>
+          <p:nvSpPr>
+            <p:cNvPr id="6" name="TextBox 5">
+              <a:extLst>
+                <a:ext uri="{FF2B5EF4-FFF2-40B4-BE49-F238E27FC236}">
+                  <a16:creationId xmlns:a16="http://schemas.microsoft.com/office/drawing/2014/main" id="{81B5616A-0B15-41DF-AB41-F4317B0ACFD5}"/>
+                </a:ext>
+              </a:extLst>
+            </p:cNvPr>
+            <p:cNvSpPr txBox="1"/>
+            <p:nvPr/>
+          </p:nvSpPr>
+          <p:spPr>
+            <a:xfrm>
+              <a:off x="409451" y="2658348"/>
+              <a:ext cx="9122732" cy="1815882"/>
+            </a:xfrm>
+            <a:prstGeom prst="rect">
+              <a:avLst/>
+            </a:prstGeom>
+            <a:noFill/>
+          </p:spPr>
+          <p:txBody>
+            <a:bodyPr wrap="square" rtlCol="0">
+              <a:spAutoFit/>
+            </a:bodyPr>
+            <a:lstStyle/>
+            <a:p>
+              <a:pPr algn="ctr"/>
+              <a:r>
+                <a:rPr lang="en-GB" sz="2800" dirty="0">
+                  <a:solidFill>
+                    <a:schemeClr val="bg1"/>
+                  </a:solidFill>
+                </a:rPr>
+                <a:t>For those who are wondering, we are currently not accepting any new staff members over the internet. You must be able to contact a staff member in person to apply to be a staff member for </a:t>
+              </a:r>
+              <a:r>
+                <a:rPr lang="en-GB" sz="2800" dirty="0" err="1">
+                  <a:solidFill>
+                    <a:schemeClr val="bg1"/>
+                  </a:solidFill>
+                </a:rPr>
+                <a:t>GameProxy</a:t>
+              </a:r>
+              <a:r>
+                <a:rPr lang="en-GB" sz="2800" dirty="0">
+                  <a:solidFill>
+                    <a:schemeClr val="bg1"/>
+                  </a:solidFill>
+                </a:rPr>
+                <a:t>.</a:t>
+              </a:r>
+            </a:p>
+          </p:txBody>
+        </p:sp>
+        <p:grpSp>
+          <p:nvGrpSpPr>
+            <p:cNvPr id="5" name="Group 4">
+              <a:extLst>
+                <a:ext uri="{FF2B5EF4-FFF2-40B4-BE49-F238E27FC236}">
+                  <a16:creationId xmlns:a16="http://schemas.microsoft.com/office/drawing/2014/main" id="{2653E389-C450-4BB8-B604-1007A25C6E72}"/>
+                </a:ext>
+              </a:extLst>
+            </p:cNvPr>
+            <p:cNvGrpSpPr/>
+            <p:nvPr/>
+          </p:nvGrpSpPr>
+          <p:grpSpPr>
+            <a:xfrm>
+              <a:off x="10990889" y="341505"/>
+              <a:ext cx="4008216" cy="2430508"/>
+              <a:chOff x="10998033" y="17536"/>
+              <a:chExt cx="4008216" cy="2430508"/>
+            </a:xfrm>
+          </p:grpSpPr>
+          <p:sp>
+            <p:nvSpPr>
+              <p:cNvPr id="2" name="Rectangle: Rounded Corners 1">
+                <a:extLst>
+                  <a:ext uri="{FF2B5EF4-FFF2-40B4-BE49-F238E27FC236}">
+                    <a16:creationId xmlns:a16="http://schemas.microsoft.com/office/drawing/2014/main" id="{E6EFC91E-8B95-4513-9F29-52D8A844CD9B}"/>
+                  </a:ext>
+                </a:extLst>
+              </p:cNvPr>
+              <p:cNvSpPr/>
+              <p:nvPr/>
+            </p:nvSpPr>
+            <p:spPr>
+              <a:xfrm>
+                <a:off x="10998033" y="448352"/>
+                <a:ext cx="4008216" cy="614115"/>
+              </a:xfrm>
+              <a:prstGeom prst="roundRect">
+                <a:avLst/>
+              </a:prstGeom>
+              <a:solidFill>
+                <a:schemeClr val="bg1">
+                  <a:lumMod val="90000"/>
+                  <a:lumOff val="10000"/>
+                </a:schemeClr>
+              </a:solidFill>
+              <a:ln>
+                <a:noFill/>
+              </a:ln>
+            </p:spPr>
+            <p:style>
+              <a:lnRef idx="2">
+                <a:schemeClr val="accent1">
+                  <a:shade val="50000"/>
+                </a:schemeClr>
+              </a:lnRef>
+              <a:fillRef idx="1">
+                <a:schemeClr val="accent1"/>
+              </a:fillRef>
+              <a:effectRef idx="0">
+                <a:schemeClr val="accent1"/>
+              </a:effectRef>
+              <a:fontRef idx="minor">
+                <a:schemeClr val="lt1"/>
+              </a:fontRef>
+            </p:style>
+            <p:txBody>
+              <a:bodyPr rtlCol="0" anchor="ctr"/>
+              <a:lstStyle/>
+              <a:p>
+                <a:r>
+                  <a:rPr lang="en-GB" sz="2800" dirty="0">
+                    <a:solidFill>
+                      <a:schemeClr val="accent2"/>
+                    </a:solidFill>
+                  </a:rPr>
+                  <a:t>Alex</a:t>
+                </a:r>
+              </a:p>
+            </p:txBody>
+          </p:sp>
+          <p:sp>
+            <p:nvSpPr>
+              <p:cNvPr id="10" name="Rectangle: Rounded Corners 9">
+                <a:extLst>
+                  <a:ext uri="{FF2B5EF4-FFF2-40B4-BE49-F238E27FC236}">
+                    <a16:creationId xmlns:a16="http://schemas.microsoft.com/office/drawing/2014/main" id="{12D9F03F-6EFC-4B0E-86A1-2E95FCEC92AB}"/>
+                  </a:ext>
+                </a:extLst>
+              </p:cNvPr>
+              <p:cNvSpPr/>
+              <p:nvPr/>
+            </p:nvSpPr>
+            <p:spPr>
+              <a:xfrm>
+                <a:off x="10998033" y="1141432"/>
+                <a:ext cx="4008216" cy="614115"/>
+              </a:xfrm>
+              <a:prstGeom prst="roundRect">
+                <a:avLst/>
+              </a:prstGeom>
+              <a:solidFill>
+                <a:schemeClr val="bg1">
+                  <a:lumMod val="90000"/>
+                  <a:lumOff val="10000"/>
+                </a:schemeClr>
+              </a:solidFill>
+              <a:ln>
+                <a:noFill/>
+              </a:ln>
+            </p:spPr>
+            <p:style>
+              <a:lnRef idx="2">
+                <a:schemeClr val="accent1">
+                  <a:shade val="50000"/>
+                </a:schemeClr>
+              </a:lnRef>
+              <a:fillRef idx="1">
+                <a:schemeClr val="accent1"/>
+              </a:fillRef>
+              <a:effectRef idx="0">
+                <a:schemeClr val="accent1"/>
+              </a:effectRef>
+              <a:fontRef idx="minor">
+                <a:schemeClr val="lt1"/>
+              </a:fontRef>
+            </p:style>
+            <p:txBody>
+              <a:bodyPr rtlCol="0" anchor="ctr"/>
+              <a:lstStyle/>
+              <a:p>
+                <a:r>
+                  <a:rPr lang="en-GB" sz="2800" dirty="0">
+                    <a:solidFill>
+                      <a:schemeClr val="accent2"/>
+                    </a:solidFill>
+                  </a:rPr>
+                  <a:t>James W</a:t>
+                </a:r>
+              </a:p>
+            </p:txBody>
+          </p:sp>
+          <p:sp>
+            <p:nvSpPr>
+              <p:cNvPr id="11" name="Rectangle: Rounded Corners 10">
+                <a:extLst>
+                  <a:ext uri="{FF2B5EF4-FFF2-40B4-BE49-F238E27FC236}">
+                    <a16:creationId xmlns:a16="http://schemas.microsoft.com/office/drawing/2014/main" id="{2645D7D0-00BE-4850-98E6-EF464E544458}"/>
+                  </a:ext>
+                </a:extLst>
+              </p:cNvPr>
+              <p:cNvSpPr/>
+              <p:nvPr/>
+            </p:nvSpPr>
+            <p:spPr>
+              <a:xfrm>
+                <a:off x="10998033" y="1833929"/>
+                <a:ext cx="4008216" cy="614115"/>
+              </a:xfrm>
+              <a:prstGeom prst="roundRect">
+                <a:avLst/>
+              </a:prstGeom>
+              <a:solidFill>
+                <a:schemeClr val="bg1">
+                  <a:lumMod val="90000"/>
+                  <a:lumOff val="10000"/>
+                </a:schemeClr>
+              </a:solidFill>
+              <a:ln>
+                <a:noFill/>
+              </a:ln>
+            </p:spPr>
+            <p:style>
+              <a:lnRef idx="2">
+                <a:schemeClr val="accent1">
+                  <a:shade val="50000"/>
+                </a:schemeClr>
+              </a:lnRef>
+              <a:fillRef idx="1">
+                <a:schemeClr val="accent1"/>
+              </a:fillRef>
+              <a:effectRef idx="0">
+                <a:schemeClr val="accent1"/>
+              </a:effectRef>
+              <a:fontRef idx="minor">
+                <a:schemeClr val="lt1"/>
+              </a:fontRef>
+            </p:style>
+            <p:txBody>
+              <a:bodyPr rtlCol="0" anchor="ctr"/>
+              <a:lstStyle/>
+              <a:p>
+                <a:r>
+                  <a:rPr lang="en-GB" sz="2800" dirty="0">
+                    <a:solidFill>
+                      <a:schemeClr val="accent2"/>
+                    </a:solidFill>
+                  </a:rPr>
+                  <a:t>Daniel</a:t>
+                </a:r>
+              </a:p>
+            </p:txBody>
+          </p:sp>
+          <p:sp>
+            <p:nvSpPr>
+              <p:cNvPr id="14" name="TextBox 13">
+                <a:extLst>
+                  <a:ext uri="{FF2B5EF4-FFF2-40B4-BE49-F238E27FC236}">
+                    <a16:creationId xmlns:a16="http://schemas.microsoft.com/office/drawing/2014/main" id="{1B8B0085-8C70-4BB7-80E1-63A9B11602C3}"/>
+                  </a:ext>
+                </a:extLst>
+              </p:cNvPr>
+              <p:cNvSpPr txBox="1"/>
+              <p:nvPr/>
+            </p:nvSpPr>
+            <p:spPr>
+              <a:xfrm>
+                <a:off x="10998033" y="17536"/>
+                <a:ext cx="4008216" cy="400110"/>
+              </a:xfrm>
+              <a:prstGeom prst="rect">
+                <a:avLst/>
+              </a:prstGeom>
+              <a:noFill/>
+            </p:spPr>
+            <p:txBody>
+              <a:bodyPr wrap="square" rtlCol="0">
+                <a:spAutoFit/>
+              </a:bodyPr>
+              <a:lstStyle/>
+              <a:p>
+                <a:r>
+                  <a:rPr lang="en-GB" sz="2000" dirty="0">
+                    <a:solidFill>
+                      <a:schemeClr val="bg1"/>
+                    </a:solidFill>
+                  </a:rPr>
+                  <a:t>Here’s our staff members (2/2):</a:t>
+                </a:r>
+              </a:p>
+            </p:txBody>
+          </p:sp>
+        </p:grpSp>
+      </p:grpSp>
+    </p:spTree>
+    <p:extLst>
+      <p:ext uri="{BB962C8B-B14F-4D97-AF65-F5344CB8AC3E}">
+        <p14:creationId xmlns:p14="http://schemas.microsoft.com/office/powerpoint/2010/main" val="1795433987"/>
       </p:ext>
     </p:extLst>
   </p:cSld>

</xml_diff>

<commit_message>
Fix staff MOTD rendering
</commit_message>
<xml_diff>
--- a/motd/Pages.pptx
+++ b/motd/Pages.pptx
@@ -276,7 +276,7 @@
           <a:p>
             <a:fld id="{C370886D-31C3-49D5-85A0-7ED07EBF33A1}" type="datetimeFigureOut">
               <a:rPr lang="en-GB" smtClean="0"/>
-              <a:t>21/11/2018</a:t>
+              <a:t>22/11/2018</a:t>
             </a:fld>
             <a:endParaRPr lang="en-GB"/>
           </a:p>
@@ -476,7 +476,7 @@
           <a:p>
             <a:fld id="{C370886D-31C3-49D5-85A0-7ED07EBF33A1}" type="datetimeFigureOut">
               <a:rPr lang="en-GB" smtClean="0"/>
-              <a:t>21/11/2018</a:t>
+              <a:t>22/11/2018</a:t>
             </a:fld>
             <a:endParaRPr lang="en-GB"/>
           </a:p>
@@ -686,7 +686,7 @@
           <a:p>
             <a:fld id="{C370886D-31C3-49D5-85A0-7ED07EBF33A1}" type="datetimeFigureOut">
               <a:rPr lang="en-GB" smtClean="0"/>
-              <a:t>21/11/2018</a:t>
+              <a:t>22/11/2018</a:t>
             </a:fld>
             <a:endParaRPr lang="en-GB"/>
           </a:p>
@@ -886,7 +886,7 @@
           <a:p>
             <a:fld id="{C370886D-31C3-49D5-85A0-7ED07EBF33A1}" type="datetimeFigureOut">
               <a:rPr lang="en-GB" smtClean="0"/>
-              <a:t>21/11/2018</a:t>
+              <a:t>22/11/2018</a:t>
             </a:fld>
             <a:endParaRPr lang="en-GB"/>
           </a:p>
@@ -1162,7 +1162,7 @@
           <a:p>
             <a:fld id="{C370886D-31C3-49D5-85A0-7ED07EBF33A1}" type="datetimeFigureOut">
               <a:rPr lang="en-GB" smtClean="0"/>
-              <a:t>21/11/2018</a:t>
+              <a:t>22/11/2018</a:t>
             </a:fld>
             <a:endParaRPr lang="en-GB"/>
           </a:p>
@@ -1430,7 +1430,7 @@
           <a:p>
             <a:fld id="{C370886D-31C3-49D5-85A0-7ED07EBF33A1}" type="datetimeFigureOut">
               <a:rPr lang="en-GB" smtClean="0"/>
-              <a:t>21/11/2018</a:t>
+              <a:t>22/11/2018</a:t>
             </a:fld>
             <a:endParaRPr lang="en-GB"/>
           </a:p>
@@ -1845,7 +1845,7 @@
           <a:p>
             <a:fld id="{C370886D-31C3-49D5-85A0-7ED07EBF33A1}" type="datetimeFigureOut">
               <a:rPr lang="en-GB" smtClean="0"/>
-              <a:t>21/11/2018</a:t>
+              <a:t>22/11/2018</a:t>
             </a:fld>
             <a:endParaRPr lang="en-GB"/>
           </a:p>
@@ -1987,7 +1987,7 @@
           <a:p>
             <a:fld id="{C370886D-31C3-49D5-85A0-7ED07EBF33A1}" type="datetimeFigureOut">
               <a:rPr lang="en-GB" smtClean="0"/>
-              <a:t>21/11/2018</a:t>
+              <a:t>22/11/2018</a:t>
             </a:fld>
             <a:endParaRPr lang="en-GB"/>
           </a:p>
@@ -2100,7 +2100,7 @@
           <a:p>
             <a:fld id="{C370886D-31C3-49D5-85A0-7ED07EBF33A1}" type="datetimeFigureOut">
               <a:rPr lang="en-GB" smtClean="0"/>
-              <a:t>21/11/2018</a:t>
+              <a:t>22/11/2018</a:t>
             </a:fld>
             <a:endParaRPr lang="en-GB"/>
           </a:p>
@@ -2413,7 +2413,7 @@
           <a:p>
             <a:fld id="{C370886D-31C3-49D5-85A0-7ED07EBF33A1}" type="datetimeFigureOut">
               <a:rPr lang="en-GB" smtClean="0"/>
-              <a:t>21/11/2018</a:t>
+              <a:t>22/11/2018</a:t>
             </a:fld>
             <a:endParaRPr lang="en-GB"/>
           </a:p>
@@ -2706,7 +2706,7 @@
           <a:p>
             <a:fld id="{C370886D-31C3-49D5-85A0-7ED07EBF33A1}" type="datetimeFigureOut">
               <a:rPr lang="en-GB" smtClean="0"/>
-              <a:t>21/11/2018</a:t>
+              <a:t>22/11/2018</a:t>
             </a:fld>
             <a:endParaRPr lang="en-GB"/>
           </a:p>
@@ -2949,7 +2949,7 @@
           <a:p>
             <a:fld id="{C370886D-31C3-49D5-85A0-7ED07EBF33A1}" type="datetimeFigureOut">
               <a:rPr lang="en-GB" smtClean="0"/>
-              <a:t>21/11/2018</a:t>
+              <a:t>22/11/2018</a:t>
             </a:fld>
             <a:endParaRPr lang="en-GB"/>
           </a:p>

</xml_diff>

<commit_message>
Fix The House GameProxy Choice MOTD
</commit_message>
<xml_diff>
--- a/motd/Pages.pptx
+++ b/motd/Pages.pptx
@@ -4969,8 +4969,8 @@
         </p:nvSpPr>
         <p:spPr>
           <a:xfrm>
-            <a:off x="13064219" y="4854558"/>
-            <a:ext cx="2488519" cy="338554"/>
+            <a:off x="13359474" y="4854558"/>
+            <a:ext cx="2193264" cy="338554"/>
           </a:xfrm>
           <a:prstGeom prst="rect">
             <a:avLst/>
@@ -4985,7 +4985,7 @@
           <a:p>
             <a:r>
               <a:rPr lang="en-GB" sz="1600" dirty="0"/>
-              <a:t>NOT A PAID PROMOTION</a:t>
+              <a:t>NOT a Paid Promotion</a:t>
             </a:r>
           </a:p>
         </p:txBody>
@@ -5090,7 +5090,7 @@
         <p:spPr>
           <a:xfrm>
             <a:off x="13359474" y="4537305"/>
-            <a:ext cx="3031704" cy="338554"/>
+            <a:ext cx="2193264" cy="338554"/>
           </a:xfrm>
           <a:prstGeom prst="rect">
             <a:avLst/>

</xml_diff>

<commit_message>
Add Merch to GP
</commit_message>
<xml_diff>
--- a/motd/Pages.pptx
+++ b/motd/Pages.pptx
@@ -7,10 +7,11 @@
   <p:sldIdLst>
     <p:sldId id="256" r:id="rId2"/>
     <p:sldId id="261" r:id="rId3"/>
-    <p:sldId id="257" r:id="rId4"/>
-    <p:sldId id="258" r:id="rId5"/>
-    <p:sldId id="259" r:id="rId6"/>
-    <p:sldId id="260" r:id="rId7"/>
+    <p:sldId id="262" r:id="rId4"/>
+    <p:sldId id="257" r:id="rId5"/>
+    <p:sldId id="258" r:id="rId6"/>
+    <p:sldId id="259" r:id="rId7"/>
+    <p:sldId id="260" r:id="rId8"/>
   </p:sldIdLst>
   <p:sldSz cx="15552738" cy="5184775"/>
   <p:notesSz cx="6858000" cy="9144000"/>
@@ -277,7 +278,7 @@
           <a:p>
             <a:fld id="{C370886D-31C3-49D5-85A0-7ED07EBF33A1}" type="datetimeFigureOut">
               <a:rPr lang="en-GB" smtClean="0"/>
-              <a:t>14/12/2018</a:t>
+              <a:t>15/12/2018</a:t>
             </a:fld>
             <a:endParaRPr lang="en-GB"/>
           </a:p>
@@ -477,7 +478,7 @@
           <a:p>
             <a:fld id="{C370886D-31C3-49D5-85A0-7ED07EBF33A1}" type="datetimeFigureOut">
               <a:rPr lang="en-GB" smtClean="0"/>
-              <a:t>14/12/2018</a:t>
+              <a:t>15/12/2018</a:t>
             </a:fld>
             <a:endParaRPr lang="en-GB"/>
           </a:p>
@@ -687,7 +688,7 @@
           <a:p>
             <a:fld id="{C370886D-31C3-49D5-85A0-7ED07EBF33A1}" type="datetimeFigureOut">
               <a:rPr lang="en-GB" smtClean="0"/>
-              <a:t>14/12/2018</a:t>
+              <a:t>15/12/2018</a:t>
             </a:fld>
             <a:endParaRPr lang="en-GB"/>
           </a:p>
@@ -887,7 +888,7 @@
           <a:p>
             <a:fld id="{C370886D-31C3-49D5-85A0-7ED07EBF33A1}" type="datetimeFigureOut">
               <a:rPr lang="en-GB" smtClean="0"/>
-              <a:t>14/12/2018</a:t>
+              <a:t>15/12/2018</a:t>
             </a:fld>
             <a:endParaRPr lang="en-GB"/>
           </a:p>
@@ -1163,7 +1164,7 @@
           <a:p>
             <a:fld id="{C370886D-31C3-49D5-85A0-7ED07EBF33A1}" type="datetimeFigureOut">
               <a:rPr lang="en-GB" smtClean="0"/>
-              <a:t>14/12/2018</a:t>
+              <a:t>15/12/2018</a:t>
             </a:fld>
             <a:endParaRPr lang="en-GB"/>
           </a:p>
@@ -1431,7 +1432,7 @@
           <a:p>
             <a:fld id="{C370886D-31C3-49D5-85A0-7ED07EBF33A1}" type="datetimeFigureOut">
               <a:rPr lang="en-GB" smtClean="0"/>
-              <a:t>14/12/2018</a:t>
+              <a:t>15/12/2018</a:t>
             </a:fld>
             <a:endParaRPr lang="en-GB"/>
           </a:p>
@@ -1846,7 +1847,7 @@
           <a:p>
             <a:fld id="{C370886D-31C3-49D5-85A0-7ED07EBF33A1}" type="datetimeFigureOut">
               <a:rPr lang="en-GB" smtClean="0"/>
-              <a:t>14/12/2018</a:t>
+              <a:t>15/12/2018</a:t>
             </a:fld>
             <a:endParaRPr lang="en-GB"/>
           </a:p>
@@ -1988,7 +1989,7 @@
           <a:p>
             <a:fld id="{C370886D-31C3-49D5-85A0-7ED07EBF33A1}" type="datetimeFigureOut">
               <a:rPr lang="en-GB" smtClean="0"/>
-              <a:t>14/12/2018</a:t>
+              <a:t>15/12/2018</a:t>
             </a:fld>
             <a:endParaRPr lang="en-GB"/>
           </a:p>
@@ -2101,7 +2102,7 @@
           <a:p>
             <a:fld id="{C370886D-31C3-49D5-85A0-7ED07EBF33A1}" type="datetimeFigureOut">
               <a:rPr lang="en-GB" smtClean="0"/>
-              <a:t>14/12/2018</a:t>
+              <a:t>15/12/2018</a:t>
             </a:fld>
             <a:endParaRPr lang="en-GB"/>
           </a:p>
@@ -2414,7 +2415,7 @@
           <a:p>
             <a:fld id="{C370886D-31C3-49D5-85A0-7ED07EBF33A1}" type="datetimeFigureOut">
               <a:rPr lang="en-GB" smtClean="0"/>
-              <a:t>14/12/2018</a:t>
+              <a:t>15/12/2018</a:t>
             </a:fld>
             <a:endParaRPr lang="en-GB"/>
           </a:p>
@@ -2707,7 +2708,7 @@
           <a:p>
             <a:fld id="{C370886D-31C3-49D5-85A0-7ED07EBF33A1}" type="datetimeFigureOut">
               <a:rPr lang="en-GB" smtClean="0"/>
-              <a:t>14/12/2018</a:t>
+              <a:t>15/12/2018</a:t>
             </a:fld>
             <a:endParaRPr lang="en-GB"/>
           </a:p>
@@ -2950,7 +2951,7 @@
           <a:p>
             <a:fld id="{C370886D-31C3-49D5-85A0-7ED07EBF33A1}" type="datetimeFigureOut">
               <a:rPr lang="en-GB" smtClean="0"/>
-              <a:t>14/12/2018</a:t>
+              <a:t>15/12/2018</a:t>
             </a:fld>
             <a:endParaRPr lang="en-GB"/>
           </a:p>
@@ -5164,8 +5165,8 @@
         </p:nvSpPr>
         <p:spPr>
           <a:xfrm>
-            <a:off x="5040109" y="391917"/>
-            <a:ext cx="5471370" cy="830997"/>
+            <a:off x="5207626" y="391917"/>
+            <a:ext cx="5136342" cy="830997"/>
           </a:xfrm>
           <a:prstGeom prst="rect">
             <a:avLst/>
@@ -5183,7 +5184,7 @@
               <a:rPr lang="en-GB" sz="4800" b="1" dirty="0">
                 <a:latin typeface="+mj-lt"/>
               </a:rPr>
-              <a:t>IN DEVELOPMENT!</a:t>
+              <a:t>WE HAVE MERCH!</a:t>
             </a:r>
           </a:p>
         </p:txBody>
@@ -5202,8 +5203,8 @@
         </p:nvSpPr>
         <p:spPr>
           <a:xfrm>
-            <a:off x="3214427" y="1222914"/>
-            <a:ext cx="9122732" cy="1384995"/>
+            <a:off x="690880" y="1222914"/>
+            <a:ext cx="14183359" cy="1384995"/>
           </a:xfrm>
           <a:prstGeom prst="rect">
             <a:avLst/>
@@ -5219,7 +5220,7 @@
             <a:pPr algn="ctr"/>
             <a:r>
               <a:rPr lang="en-GB" sz="2800" dirty="0"/>
-              <a:t>We'll be creating a vast library of games very soon! We hope to see you when we've finished our website. In the meantime, stick around to see what we're doing!</a:t>
+              <a:t>We deliver to every country in the world excluding Iran, Cuba, Sudan, North Korea, Syria and Crimea and we have really low prices. This is a great way to support GameProxy. We have stickers, clothing, cases and much more (even a duvet if you really want!)</a:t>
             </a:r>
           </a:p>
         </p:txBody>
@@ -5238,8 +5239,8 @@
         </p:nvSpPr>
         <p:spPr>
           <a:xfrm>
-            <a:off x="6421016" y="3746440"/>
-            <a:ext cx="2718683" cy="777210"/>
+            <a:off x="5682781" y="3848040"/>
+            <a:ext cx="4186024" cy="777210"/>
           </a:xfrm>
           <a:prstGeom prst="roundRect">
             <a:avLst/>
@@ -5283,7 +5284,7 @@
                   <a:schemeClr val="tx1"/>
                 </a:solidFill>
               </a:rPr>
-              <a:t>VIEW ON GITHUB</a:t>
+              <a:t>GO TO OUR MERCH STORE</a:t>
             </a:r>
           </a:p>
         </p:txBody>
@@ -5319,7 +5320,7 @@
             <a:pPr algn="ctr"/>
             <a:r>
               <a:rPr lang="en-GB" sz="2800" dirty="0"/>
-              <a:t>You can also visit our GitHub repository if you’re bored.</a:t>
+              <a:t>It is hosted on Redbubble and we get 15% of the sale.</a:t>
             </a:r>
           </a:p>
         </p:txBody>
@@ -5327,7 +5328,7 @@
     </p:spTree>
     <p:extLst>
       <p:ext uri="{BB962C8B-B14F-4D97-AF65-F5344CB8AC3E}">
-        <p14:creationId xmlns:p14="http://schemas.microsoft.com/office/powerpoint/2010/main" val="1232185626"/>
+        <p14:creationId xmlns:p14="http://schemas.microsoft.com/office/powerpoint/2010/main" val="652740660"/>
       </p:ext>
     </p:extLst>
   </p:cSld>
@@ -5378,8 +5379,8 @@
         </p:nvSpPr>
         <p:spPr>
           <a:xfrm>
-            <a:off x="6193470" y="391917"/>
-            <a:ext cx="3164649" cy="830997"/>
+            <a:off x="5040109" y="391917"/>
+            <a:ext cx="5471370" cy="830997"/>
           </a:xfrm>
           <a:prstGeom prst="rect">
             <a:avLst/>
@@ -5395,12 +5396,9 @@
             <a:pPr algn="ctr"/>
             <a:r>
               <a:rPr lang="en-GB" sz="4800" b="1" dirty="0">
-                <a:solidFill>
-                  <a:schemeClr val="accent3"/>
-                </a:solidFill>
                 <a:latin typeface="+mj-lt"/>
               </a:rPr>
-              <a:t>WARNING!</a:t>
+              <a:t>IN DEVELOPMENT!</a:t>
             </a:r>
           </a:p>
         </p:txBody>
@@ -5436,14 +5434,7 @@
             <a:pPr algn="ctr"/>
             <a:r>
               <a:rPr lang="en-GB" sz="2800" dirty="0"/>
-              <a:t>If a game doesn't have a verified symbol, it may contain</a:t>
-            </a:r>
-          </a:p>
-          <a:p>
-            <a:pPr algn="ctr"/>
-            <a:r>
-              <a:rPr lang="en-GB" sz="2800" dirty="0"/>
-              <a:t>                    extreme violence, offensive material or inappropriate material.</a:t>
+              <a:t>We'll be creating a vast library of games very soon! We hope to see you when we've finished our website. In the meantime, stick around to see what we're doing!</a:t>
             </a:r>
           </a:p>
         </p:txBody>
@@ -5507,6 +5498,230 @@
                   <a:schemeClr val="tx1"/>
                 </a:solidFill>
               </a:rPr>
+              <a:t>VIEW ON GITHUB</a:t>
+            </a:r>
+          </a:p>
+        </p:txBody>
+      </p:sp>
+      <p:sp>
+        <p:nvSpPr>
+          <p:cNvPr id="17" name="TextBox 16">
+            <a:extLst>
+              <a:ext uri="{FF2B5EF4-FFF2-40B4-BE49-F238E27FC236}">
+                <a16:creationId xmlns:a16="http://schemas.microsoft.com/office/drawing/2014/main" id="{39B4830A-2DBF-455F-AB74-C1616A3F0F43}"/>
+              </a:ext>
+            </a:extLst>
+          </p:cNvPr>
+          <p:cNvSpPr txBox="1"/>
+          <p:nvPr/>
+        </p:nvSpPr>
+        <p:spPr>
+          <a:xfrm>
+            <a:off x="3214427" y="2915686"/>
+            <a:ext cx="9122732" cy="523220"/>
+          </a:xfrm>
+          <a:prstGeom prst="rect">
+            <a:avLst/>
+          </a:prstGeom>
+          <a:noFill/>
+        </p:spPr>
+        <p:txBody>
+          <a:bodyPr wrap="square" rtlCol="0">
+            <a:spAutoFit/>
+          </a:bodyPr>
+          <a:lstStyle/>
+          <a:p>
+            <a:pPr algn="ctr"/>
+            <a:r>
+              <a:rPr lang="en-GB" sz="2800" dirty="0"/>
+              <a:t>You can also visit our GitHub repository if you’re bored.</a:t>
+            </a:r>
+          </a:p>
+        </p:txBody>
+      </p:sp>
+    </p:spTree>
+    <p:extLst>
+      <p:ext uri="{BB962C8B-B14F-4D97-AF65-F5344CB8AC3E}">
+        <p14:creationId xmlns:p14="http://schemas.microsoft.com/office/powerpoint/2010/main" val="1232185626"/>
+      </p:ext>
+    </p:extLst>
+  </p:cSld>
+  <p:clrMapOvr>
+    <a:masterClrMapping/>
+  </p:clrMapOvr>
+</p:sld>
+</file>
+
+<file path=ppt/slides/slide5.xml><?xml version="1.0" encoding="utf-8"?>
+<p:sld xmlns:a="http://schemas.openxmlformats.org/drawingml/2006/main" xmlns:r="http://schemas.openxmlformats.org/officeDocument/2006/relationships" xmlns:p="http://schemas.openxmlformats.org/presentationml/2006/main">
+  <p:cSld>
+    <p:bg>
+      <p:bgPr>
+        <a:solidFill>
+          <a:schemeClr val="tx2">
+            <a:lumMod val="25000"/>
+          </a:schemeClr>
+        </a:solidFill>
+        <a:effectLst/>
+      </p:bgPr>
+    </p:bg>
+    <p:spTree>
+      <p:nvGrpSpPr>
+        <p:cNvPr id="1" name=""/>
+        <p:cNvGrpSpPr/>
+        <p:nvPr/>
+      </p:nvGrpSpPr>
+      <p:grpSpPr>
+        <a:xfrm>
+          <a:off x="0" y="0"/>
+          <a:ext cx="0" cy="0"/>
+          <a:chOff x="0" y="0"/>
+          <a:chExt cx="0" cy="0"/>
+        </a:xfrm>
+      </p:grpSpPr>
+      <p:sp>
+        <p:nvSpPr>
+          <p:cNvPr id="7" name="TextBox 6">
+            <a:extLst>
+              <a:ext uri="{FF2B5EF4-FFF2-40B4-BE49-F238E27FC236}">
+                <a16:creationId xmlns:a16="http://schemas.microsoft.com/office/drawing/2014/main" id="{2AD4DB4F-2FEB-46FF-AA66-89B163A9E2B7}"/>
+              </a:ext>
+            </a:extLst>
+          </p:cNvPr>
+          <p:cNvSpPr txBox="1"/>
+          <p:nvPr/>
+        </p:nvSpPr>
+        <p:spPr>
+          <a:xfrm>
+            <a:off x="6193470" y="391917"/>
+            <a:ext cx="3164649" cy="830997"/>
+          </a:xfrm>
+          <a:prstGeom prst="rect">
+            <a:avLst/>
+          </a:prstGeom>
+          <a:noFill/>
+        </p:spPr>
+        <p:txBody>
+          <a:bodyPr wrap="none" rtlCol="0">
+            <a:spAutoFit/>
+          </a:bodyPr>
+          <a:lstStyle/>
+          <a:p>
+            <a:pPr algn="ctr"/>
+            <a:r>
+              <a:rPr lang="en-GB" sz="4800" b="1" dirty="0">
+                <a:solidFill>
+                  <a:schemeClr val="accent3"/>
+                </a:solidFill>
+                <a:latin typeface="+mj-lt"/>
+              </a:rPr>
+              <a:t>WARNING!</a:t>
+            </a:r>
+          </a:p>
+        </p:txBody>
+      </p:sp>
+      <p:sp>
+        <p:nvSpPr>
+          <p:cNvPr id="8" name="TextBox 7">
+            <a:extLst>
+              <a:ext uri="{FF2B5EF4-FFF2-40B4-BE49-F238E27FC236}">
+                <a16:creationId xmlns:a16="http://schemas.microsoft.com/office/drawing/2014/main" id="{7C6E5EB9-D4B6-4FA7-811F-347391768A37}"/>
+              </a:ext>
+            </a:extLst>
+          </p:cNvPr>
+          <p:cNvSpPr txBox="1"/>
+          <p:nvPr/>
+        </p:nvSpPr>
+        <p:spPr>
+          <a:xfrm>
+            <a:off x="3214427" y="1222914"/>
+            <a:ext cx="9122732" cy="1384995"/>
+          </a:xfrm>
+          <a:prstGeom prst="rect">
+            <a:avLst/>
+          </a:prstGeom>
+          <a:noFill/>
+        </p:spPr>
+        <p:txBody>
+          <a:bodyPr wrap="square" rtlCol="0">
+            <a:spAutoFit/>
+          </a:bodyPr>
+          <a:lstStyle/>
+          <a:p>
+            <a:pPr algn="ctr"/>
+            <a:r>
+              <a:rPr lang="en-GB" sz="2800" dirty="0"/>
+              <a:t>If a game doesn't have a verified symbol, it may contain</a:t>
+            </a:r>
+          </a:p>
+          <a:p>
+            <a:pPr algn="ctr"/>
+            <a:r>
+              <a:rPr lang="en-GB" sz="2800" dirty="0"/>
+              <a:t>                    extreme violence, offensive material or inappropriate material.</a:t>
+            </a:r>
+          </a:p>
+        </p:txBody>
+      </p:sp>
+      <p:sp>
+        <p:nvSpPr>
+          <p:cNvPr id="9" name="Rectangle: Rounded Corners 8">
+            <a:extLst>
+              <a:ext uri="{FF2B5EF4-FFF2-40B4-BE49-F238E27FC236}">
+                <a16:creationId xmlns:a16="http://schemas.microsoft.com/office/drawing/2014/main" id="{3266C22C-8E57-4DD1-8E84-7DFB518DF63A}"/>
+              </a:ext>
+            </a:extLst>
+          </p:cNvPr>
+          <p:cNvSpPr/>
+          <p:nvPr/>
+        </p:nvSpPr>
+        <p:spPr>
+          <a:xfrm>
+            <a:off x="6421016" y="3746440"/>
+            <a:ext cx="2718683" cy="777210"/>
+          </a:xfrm>
+          <a:prstGeom prst="roundRect">
+            <a:avLst/>
+          </a:prstGeom>
+          <a:solidFill>
+            <a:schemeClr val="accent1"/>
+          </a:solidFill>
+          <a:ln>
+            <a:noFill/>
+          </a:ln>
+        </p:spPr>
+        <p:style>
+          <a:lnRef idx="2">
+            <a:schemeClr val="accent1">
+              <a:shade val="50000"/>
+            </a:schemeClr>
+          </a:lnRef>
+          <a:fillRef idx="1">
+            <a:schemeClr val="accent1"/>
+          </a:fillRef>
+          <a:effectRef idx="0">
+            <a:schemeClr val="accent1"/>
+          </a:effectRef>
+          <a:fontRef idx="minor">
+            <a:schemeClr val="lt1"/>
+          </a:fontRef>
+        </p:style>
+        <p:txBody>
+          <a:bodyPr rot="0" spcFirstLastPara="0" vertOverflow="overflow" horzOverflow="overflow" vert="horz" wrap="square" lIns="0" tIns="0" rIns="0" bIns="0" numCol="1" spcCol="0" rtlCol="0" fromWordArt="0" anchor="ctr" anchorCtr="0" forceAA="0" compatLnSpc="1">
+            <a:prstTxWarp prst="textNoShape">
+              <a:avLst/>
+            </a:prstTxWarp>
+            <a:noAutofit/>
+          </a:bodyPr>
+          <a:lstStyle/>
+          <a:p>
+            <a:pPr algn="ctr"/>
+            <a:r>
+              <a:rPr lang="en-GB" sz="2400" dirty="0">
+                <a:solidFill>
+                  <a:schemeClr val="tx1"/>
+                </a:solidFill>
+              </a:rPr>
               <a:t>REPORT A GAME</a:t>
             </a:r>
           </a:p>
@@ -5561,7 +5776,7 @@
 </p:sld>
 </file>
 
-<file path=ppt/slides/slide5.xml><?xml version="1.0" encoding="utf-8"?>
+<file path=ppt/slides/slide6.xml><?xml version="1.0" encoding="utf-8"?>
 <p:sld xmlns:a="http://schemas.openxmlformats.org/drawingml/2006/main" xmlns:r="http://schemas.openxmlformats.org/officeDocument/2006/relationships" xmlns:p="http://schemas.openxmlformats.org/presentationml/2006/main">
   <p:cSld>
     <p:bg>
@@ -6218,7 +6433,7 @@
 </p:sld>
 </file>
 
-<file path=ppt/slides/slide6.xml><?xml version="1.0" encoding="utf-8"?>
+<file path=ppt/slides/slide7.xml><?xml version="1.0" encoding="utf-8"?>
 <p:sld xmlns:a="http://schemas.openxmlformats.org/drawingml/2006/main" xmlns:r="http://schemas.openxmlformats.org/officeDocument/2006/relationships" xmlns:p="http://schemas.openxmlformats.org/presentationml/2006/main">
   <p:cSld>
     <p:bg>

</xml_diff>